<commit_message>
Aggiunti ultimi diagrammi attività
</commit_message>
<xml_diff>
--- a/Progetto/PresentazioneAlex.pptx
+++ b/Progetto/PresentazioneAlex.pptx
@@ -5,7 +5,7 @@
     <p:sldMasterId id="2147483648" r:id="rId1"/>
   </p:sldMasterIdLst>
   <p:notesMasterIdLst>
-    <p:notesMasterId r:id="rId10"/>
+    <p:notesMasterId r:id="rId14"/>
   </p:notesMasterIdLst>
   <p:sldIdLst>
     <p:sldId id="292" r:id="rId2"/>
@@ -16,6 +16,10 @@
     <p:sldId id="298" r:id="rId7"/>
     <p:sldId id="299" r:id="rId8"/>
     <p:sldId id="300" r:id="rId9"/>
+    <p:sldId id="301" r:id="rId10"/>
+    <p:sldId id="302" r:id="rId11"/>
+    <p:sldId id="303" r:id="rId12"/>
+    <p:sldId id="304" r:id="rId13"/>
   </p:sldIdLst>
   <p:sldSz cx="12192000" cy="6858000"/>
   <p:notesSz cx="6858000" cy="9144000"/>
@@ -388,7 +392,7 @@
           <a:p>
             <a:fld id="{011CA133-7696-465E-9A3E-116FF29C29C2}" type="slidenum">
               <a:rPr lang="it-IT" smtClean="0"/>
-              <a:t>‹N›</a:t>
+              <a:t>‹#›</a:t>
             </a:fld>
             <a:endParaRPr lang="it-IT"/>
           </a:p>
@@ -698,7 +702,7 @@
           <a:p>
             <a:fld id="{AFB85319-5DF8-4B17-9881-6D5B2C7AB305}" type="slidenum">
               <a:rPr lang="it-IT" smtClean="0"/>
-              <a:t>‹N›</a:t>
+              <a:t>‹#›</a:t>
             </a:fld>
             <a:endParaRPr lang="it-IT"/>
           </a:p>
@@ -896,7 +900,7 @@
           <a:p>
             <a:fld id="{AFB85319-5DF8-4B17-9881-6D5B2C7AB305}" type="slidenum">
               <a:rPr lang="it-IT" smtClean="0"/>
-              <a:t>‹N›</a:t>
+              <a:t>‹#›</a:t>
             </a:fld>
             <a:endParaRPr lang="it-IT"/>
           </a:p>
@@ -1104,7 +1108,7 @@
           <a:p>
             <a:fld id="{AFB85319-5DF8-4B17-9881-6D5B2C7AB305}" type="slidenum">
               <a:rPr lang="it-IT" smtClean="0"/>
-              <a:t>‹N›</a:t>
+              <a:t>‹#›</a:t>
             </a:fld>
             <a:endParaRPr lang="it-IT"/>
           </a:p>
@@ -1302,7 +1306,7 @@
           <a:p>
             <a:fld id="{AFB85319-5DF8-4B17-9881-6D5B2C7AB305}" type="slidenum">
               <a:rPr lang="it-IT" smtClean="0"/>
-              <a:t>‹N›</a:t>
+              <a:t>‹#›</a:t>
             </a:fld>
             <a:endParaRPr lang="it-IT"/>
           </a:p>
@@ -1577,7 +1581,7 @@
           <a:p>
             <a:fld id="{AFB85319-5DF8-4B17-9881-6D5B2C7AB305}" type="slidenum">
               <a:rPr lang="it-IT" smtClean="0"/>
-              <a:t>‹N›</a:t>
+              <a:t>‹#›</a:t>
             </a:fld>
             <a:endParaRPr lang="it-IT"/>
           </a:p>
@@ -1842,7 +1846,7 @@
           <a:p>
             <a:fld id="{AFB85319-5DF8-4B17-9881-6D5B2C7AB305}" type="slidenum">
               <a:rPr lang="it-IT" smtClean="0"/>
-              <a:t>‹N›</a:t>
+              <a:t>‹#›</a:t>
             </a:fld>
             <a:endParaRPr lang="it-IT"/>
           </a:p>
@@ -2254,7 +2258,7 @@
           <a:p>
             <a:fld id="{AFB85319-5DF8-4B17-9881-6D5B2C7AB305}" type="slidenum">
               <a:rPr lang="it-IT" smtClean="0"/>
-              <a:t>‹N›</a:t>
+              <a:t>‹#›</a:t>
             </a:fld>
             <a:endParaRPr lang="it-IT"/>
           </a:p>
@@ -2395,7 +2399,7 @@
           <a:p>
             <a:fld id="{AFB85319-5DF8-4B17-9881-6D5B2C7AB305}" type="slidenum">
               <a:rPr lang="it-IT" smtClean="0"/>
-              <a:t>‹N›</a:t>
+              <a:t>‹#›</a:t>
             </a:fld>
             <a:endParaRPr lang="it-IT"/>
           </a:p>
@@ -2508,7 +2512,7 @@
           <a:p>
             <a:fld id="{AFB85319-5DF8-4B17-9881-6D5B2C7AB305}" type="slidenum">
               <a:rPr lang="it-IT" smtClean="0"/>
-              <a:t>‹N›</a:t>
+              <a:t>‹#›</a:t>
             </a:fld>
             <a:endParaRPr lang="it-IT"/>
           </a:p>
@@ -2819,7 +2823,7 @@
           <a:p>
             <a:fld id="{AFB85319-5DF8-4B17-9881-6D5B2C7AB305}" type="slidenum">
               <a:rPr lang="it-IT" smtClean="0"/>
-              <a:t>‹N›</a:t>
+              <a:t>‹#›</a:t>
             </a:fld>
             <a:endParaRPr lang="it-IT"/>
           </a:p>
@@ -3107,7 +3111,7 @@
           <a:p>
             <a:fld id="{AFB85319-5DF8-4B17-9881-6D5B2C7AB305}" type="slidenum">
               <a:rPr lang="it-IT" smtClean="0"/>
-              <a:t>‹N›</a:t>
+              <a:t>‹#›</a:t>
             </a:fld>
             <a:endParaRPr lang="it-IT"/>
           </a:p>
@@ -3384,7 +3388,7 @@
           <a:p>
             <a:fld id="{AFB85319-5DF8-4B17-9881-6D5B2C7AB305}" type="slidenum">
               <a:rPr lang="it-IT" smtClean="0"/>
-              <a:t>‹N›</a:t>
+              <a:t>‹#›</a:t>
             </a:fld>
             <a:endParaRPr lang="it-IT"/>
           </a:p>
@@ -3933,6 +3937,709 @@
 </p:sld>
 </file>
 
+<file path=ppt/slides/slide10.xml><?xml version="1.0" encoding="utf-8"?>
+<p:sld xmlns:a="http://schemas.openxmlformats.org/drawingml/2006/main" xmlns:r="http://schemas.openxmlformats.org/officeDocument/2006/relationships" xmlns:p="http://schemas.openxmlformats.org/presentationml/2006/main">
+  <p:cSld>
+    <p:spTree>
+      <p:nvGrpSpPr>
+        <p:cNvPr id="1" name=""/>
+        <p:cNvGrpSpPr/>
+        <p:nvPr/>
+      </p:nvGrpSpPr>
+      <p:grpSpPr>
+        <a:xfrm>
+          <a:off x="0" y="0"/>
+          <a:ext cx="0" cy="0"/>
+          <a:chOff x="0" y="0"/>
+          <a:chExt cx="0" cy="0"/>
+        </a:xfrm>
+      </p:grpSpPr>
+      <p:sp>
+        <p:nvSpPr>
+          <p:cNvPr id="4" name="Segnaposto numero diapositiva 3">
+            <a:extLst>
+              <a:ext uri="{FF2B5EF4-FFF2-40B4-BE49-F238E27FC236}">
+                <a16:creationId xmlns:a16="http://schemas.microsoft.com/office/drawing/2014/main" id="{91E057A0-BAB1-4D57-BDBD-F8F3DE02BEE1}"/>
+              </a:ext>
+            </a:extLst>
+          </p:cNvPr>
+          <p:cNvSpPr>
+            <a:spLocks noGrp="1"/>
+          </p:cNvSpPr>
+          <p:nvPr>
+            <p:ph type="sldNum" sz="quarter" idx="12"/>
+          </p:nvPr>
+        </p:nvSpPr>
+        <p:spPr/>
+        <p:txBody>
+          <a:bodyPr/>
+          <a:lstStyle/>
+          <a:p>
+            <a:fld id="{AFB85319-5DF8-4B17-9881-6D5B2C7AB305}" type="slidenum">
+              <a:rPr lang="it-IT" smtClean="0"/>
+              <a:t>10</a:t>
+            </a:fld>
+            <a:endParaRPr lang="it-IT"/>
+          </a:p>
+        </p:txBody>
+      </p:sp>
+      <p:pic>
+        <p:nvPicPr>
+          <p:cNvPr id="6" name="Immagine 5">
+            <a:extLst>
+              <a:ext uri="{FF2B5EF4-FFF2-40B4-BE49-F238E27FC236}">
+                <a16:creationId xmlns:a16="http://schemas.microsoft.com/office/drawing/2014/main" id="{64DD2710-C925-4AEB-B772-6D532D848EB4}"/>
+              </a:ext>
+            </a:extLst>
+          </p:cNvPr>
+          <p:cNvPicPr>
+            <a:picLocks noChangeAspect="1"/>
+          </p:cNvPicPr>
+          <p:nvPr/>
+        </p:nvPicPr>
+        <p:blipFill rotWithShape="1">
+          <a:blip r:embed="rId2"/>
+          <a:srcRect l="5289" t="10969" r="40175" b="12551"/>
+          <a:stretch/>
+        </p:blipFill>
+        <p:spPr>
+          <a:xfrm>
+            <a:off x="215980" y="231353"/>
+            <a:ext cx="5880020" cy="1295266"/>
+          </a:xfrm>
+          <a:prstGeom prst="rect">
+            <a:avLst/>
+          </a:prstGeom>
+        </p:spPr>
+      </p:pic>
+      <p:sp>
+        <p:nvSpPr>
+          <p:cNvPr id="8" name="CasellaDiTesto 7">
+            <a:extLst>
+              <a:ext uri="{FF2B5EF4-FFF2-40B4-BE49-F238E27FC236}">
+                <a16:creationId xmlns:a16="http://schemas.microsoft.com/office/drawing/2014/main" id="{3E0E40B7-DD25-4779-A260-DCF2A62C4B41}"/>
+              </a:ext>
+            </a:extLst>
+          </p:cNvPr>
+          <p:cNvSpPr txBox="1"/>
+          <p:nvPr/>
+        </p:nvSpPr>
+        <p:spPr>
+          <a:xfrm>
+            <a:off x="1562771" y="772221"/>
+            <a:ext cx="4451668" cy="584775"/>
+          </a:xfrm>
+          <a:prstGeom prst="rect">
+            <a:avLst/>
+          </a:prstGeom>
+          <a:noFill/>
+        </p:spPr>
+        <p:txBody>
+          <a:bodyPr wrap="none" rtlCol="0">
+            <a:spAutoFit/>
+          </a:bodyPr>
+          <a:lstStyle>
+            <a:defPPr>
+              <a:defRPr lang="it-IT"/>
+            </a:defPPr>
+            <a:lvl1pPr>
+              <a:defRPr sz="4800">
+                <a:ln w="0"/>
+                <a:solidFill>
+                  <a:srgbClr val="002060"/>
+                </a:solidFill>
+                <a:effectLst>
+                  <a:outerShdw blurRad="38100" dist="25400" dir="5400000" algn="ctr" rotWithShape="0">
+                    <a:srgbClr val="6E747A">
+                      <a:alpha val="43000"/>
+                    </a:srgbClr>
+                  </a:outerShdw>
+                </a:effectLst>
+              </a:defRPr>
+            </a:lvl1pPr>
+          </a:lstStyle>
+          <a:p>
+            <a:r>
+              <a:rPr lang="en-US" sz="3200" dirty="0"/>
+              <a:t>Diag16 - </a:t>
+            </a:r>
+            <a:r>
+              <a:rPr lang="en-US" sz="3200" dirty="0" err="1"/>
+              <a:t>Controllo</a:t>
+            </a:r>
+            <a:r>
+              <a:rPr lang="en-US" sz="3200" dirty="0"/>
+              <a:t> </a:t>
+            </a:r>
+            <a:r>
+              <a:rPr lang="en-US" sz="3200" dirty="0" err="1"/>
+              <a:t>Storico</a:t>
+            </a:r>
+            <a:endParaRPr lang="it-IT" sz="3200" i="1" dirty="0"/>
+          </a:p>
+        </p:txBody>
+      </p:sp>
+      <p:pic>
+        <p:nvPicPr>
+          <p:cNvPr id="9" name="Picture 2" descr="Università degli Studi di Milano-Bicocca - Wikipedia">
+            <a:extLst>
+              <a:ext uri="{FF2B5EF4-FFF2-40B4-BE49-F238E27FC236}">
+                <a16:creationId xmlns:a16="http://schemas.microsoft.com/office/drawing/2014/main" id="{9D1896BC-6EF3-43D9-B8A2-217137CA9550}"/>
+              </a:ext>
+            </a:extLst>
+          </p:cNvPr>
+          <p:cNvPicPr>
+            <a:picLocks noChangeAspect="1" noChangeArrowheads="1"/>
+          </p:cNvPicPr>
+          <p:nvPr/>
+        </p:nvPicPr>
+        <p:blipFill>
+          <a:blip r:embed="rId3">
+            <a:extLst>
+              <a:ext uri="{28A0092B-C50C-407E-A947-70E740481C1C}">
+                <a14:useLocalDpi xmlns:a14="http://schemas.microsoft.com/office/drawing/2010/main" val="0"/>
+              </a:ext>
+            </a:extLst>
+          </a:blip>
+          <a:srcRect/>
+          <a:stretch>
+            <a:fillRect/>
+          </a:stretch>
+        </p:blipFill>
+        <p:spPr bwMode="auto">
+          <a:xfrm>
+            <a:off x="215979" y="254984"/>
+            <a:ext cx="1346792" cy="1331078"/>
+          </a:xfrm>
+          <a:prstGeom prst="rect">
+            <a:avLst/>
+          </a:prstGeom>
+          <a:noFill/>
+          <a:extLst>
+            <a:ext uri="{909E8E84-426E-40DD-AFC4-6F175D3DCCD1}">
+              <a14:hiddenFill xmlns:a14="http://schemas.microsoft.com/office/drawing/2010/main">
+                <a:solidFill>
+                  <a:srgbClr val="FFFFFF"/>
+                </a:solidFill>
+              </a14:hiddenFill>
+            </a:ext>
+          </a:extLst>
+        </p:spPr>
+      </p:pic>
+      <p:pic>
+        <p:nvPicPr>
+          <p:cNvPr id="3" name="Picture 2" descr="Graphical user interface&#10;&#10;Description automatically generated">
+            <a:extLst>
+              <a:ext uri="{FF2B5EF4-FFF2-40B4-BE49-F238E27FC236}">
+                <a16:creationId xmlns:a16="http://schemas.microsoft.com/office/drawing/2014/main" id="{E089C0E1-3539-157B-2891-F9E6BA4041E7}"/>
+              </a:ext>
+            </a:extLst>
+          </p:cNvPr>
+          <p:cNvPicPr>
+            <a:picLocks noChangeAspect="1"/>
+          </p:cNvPicPr>
+          <p:nvPr/>
+        </p:nvPicPr>
+        <p:blipFill>
+          <a:blip r:embed="rId4">
+            <a:extLst>
+              <a:ext uri="{28A0092B-C50C-407E-A947-70E740481C1C}">
+                <a14:useLocalDpi xmlns:a14="http://schemas.microsoft.com/office/drawing/2010/main" val="0"/>
+              </a:ext>
+            </a:extLst>
+          </a:blip>
+          <a:stretch>
+            <a:fillRect/>
+          </a:stretch>
+        </p:blipFill>
+        <p:spPr>
+          <a:xfrm>
+            <a:off x="6249239" y="1106547"/>
+            <a:ext cx="5726781" cy="4644906"/>
+          </a:xfrm>
+          <a:prstGeom prst="rect">
+            <a:avLst/>
+          </a:prstGeom>
+          <a:ln>
+            <a:solidFill>
+              <a:schemeClr val="tx1"/>
+            </a:solidFill>
+          </a:ln>
+        </p:spPr>
+      </p:pic>
+    </p:spTree>
+    <p:extLst>
+      <p:ext uri="{BB962C8B-B14F-4D97-AF65-F5344CB8AC3E}">
+        <p14:creationId xmlns:p14="http://schemas.microsoft.com/office/powerpoint/2010/main" val="1650872006"/>
+      </p:ext>
+    </p:extLst>
+  </p:cSld>
+  <p:clrMapOvr>
+    <a:masterClrMapping/>
+  </p:clrMapOvr>
+</p:sld>
+</file>
+
+<file path=ppt/slides/slide11.xml><?xml version="1.0" encoding="utf-8"?>
+<p:sld xmlns:a="http://schemas.openxmlformats.org/drawingml/2006/main" xmlns:r="http://schemas.openxmlformats.org/officeDocument/2006/relationships" xmlns:p="http://schemas.openxmlformats.org/presentationml/2006/main">
+  <p:cSld>
+    <p:spTree>
+      <p:nvGrpSpPr>
+        <p:cNvPr id="1" name=""/>
+        <p:cNvGrpSpPr/>
+        <p:nvPr/>
+      </p:nvGrpSpPr>
+      <p:grpSpPr>
+        <a:xfrm>
+          <a:off x="0" y="0"/>
+          <a:ext cx="0" cy="0"/>
+          <a:chOff x="0" y="0"/>
+          <a:chExt cx="0" cy="0"/>
+        </a:xfrm>
+      </p:grpSpPr>
+      <p:sp>
+        <p:nvSpPr>
+          <p:cNvPr id="4" name="Segnaposto numero diapositiva 3">
+            <a:extLst>
+              <a:ext uri="{FF2B5EF4-FFF2-40B4-BE49-F238E27FC236}">
+                <a16:creationId xmlns:a16="http://schemas.microsoft.com/office/drawing/2014/main" id="{91E057A0-BAB1-4D57-BDBD-F8F3DE02BEE1}"/>
+              </a:ext>
+            </a:extLst>
+          </p:cNvPr>
+          <p:cNvSpPr>
+            <a:spLocks noGrp="1"/>
+          </p:cNvSpPr>
+          <p:nvPr>
+            <p:ph type="sldNum" sz="quarter" idx="12"/>
+          </p:nvPr>
+        </p:nvSpPr>
+        <p:spPr/>
+        <p:txBody>
+          <a:bodyPr/>
+          <a:lstStyle/>
+          <a:p>
+            <a:fld id="{AFB85319-5DF8-4B17-9881-6D5B2C7AB305}" type="slidenum">
+              <a:rPr lang="it-IT" smtClean="0"/>
+              <a:t>11</a:t>
+            </a:fld>
+            <a:endParaRPr lang="it-IT"/>
+          </a:p>
+        </p:txBody>
+      </p:sp>
+      <p:pic>
+        <p:nvPicPr>
+          <p:cNvPr id="6" name="Immagine 5">
+            <a:extLst>
+              <a:ext uri="{FF2B5EF4-FFF2-40B4-BE49-F238E27FC236}">
+                <a16:creationId xmlns:a16="http://schemas.microsoft.com/office/drawing/2014/main" id="{64DD2710-C925-4AEB-B772-6D532D848EB4}"/>
+              </a:ext>
+            </a:extLst>
+          </p:cNvPr>
+          <p:cNvPicPr>
+            <a:picLocks noChangeAspect="1"/>
+          </p:cNvPicPr>
+          <p:nvPr/>
+        </p:nvPicPr>
+        <p:blipFill rotWithShape="1">
+          <a:blip r:embed="rId2"/>
+          <a:srcRect l="5290" t="10969" r="52510" b="12551"/>
+          <a:stretch/>
+        </p:blipFill>
+        <p:spPr>
+          <a:xfrm>
+            <a:off x="215981" y="231353"/>
+            <a:ext cx="4549984" cy="1295266"/>
+          </a:xfrm>
+          <a:prstGeom prst="rect">
+            <a:avLst/>
+          </a:prstGeom>
+        </p:spPr>
+      </p:pic>
+      <p:sp>
+        <p:nvSpPr>
+          <p:cNvPr id="8" name="CasellaDiTesto 7">
+            <a:extLst>
+              <a:ext uri="{FF2B5EF4-FFF2-40B4-BE49-F238E27FC236}">
+                <a16:creationId xmlns:a16="http://schemas.microsoft.com/office/drawing/2014/main" id="{3E0E40B7-DD25-4779-A260-DCF2A62C4B41}"/>
+              </a:ext>
+            </a:extLst>
+          </p:cNvPr>
+          <p:cNvSpPr txBox="1"/>
+          <p:nvPr/>
+        </p:nvSpPr>
+        <p:spPr>
+          <a:xfrm>
+            <a:off x="1562771" y="772221"/>
+            <a:ext cx="3006785" cy="584775"/>
+          </a:xfrm>
+          <a:prstGeom prst="rect">
+            <a:avLst/>
+          </a:prstGeom>
+          <a:noFill/>
+        </p:spPr>
+        <p:txBody>
+          <a:bodyPr wrap="none" rtlCol="0">
+            <a:spAutoFit/>
+          </a:bodyPr>
+          <a:lstStyle>
+            <a:defPPr>
+              <a:defRPr lang="it-IT"/>
+            </a:defPPr>
+            <a:lvl1pPr>
+              <a:defRPr sz="4800">
+                <a:ln w="0"/>
+                <a:solidFill>
+                  <a:srgbClr val="002060"/>
+                </a:solidFill>
+                <a:effectLst>
+                  <a:outerShdw blurRad="38100" dist="25400" dir="5400000" algn="ctr" rotWithShape="0">
+                    <a:srgbClr val="6E747A">
+                      <a:alpha val="43000"/>
+                    </a:srgbClr>
+                  </a:outerShdw>
+                </a:effectLst>
+              </a:defRPr>
+            </a:lvl1pPr>
+          </a:lstStyle>
+          <a:p>
+            <a:r>
+              <a:rPr lang="en-US" sz="3200" dirty="0"/>
+              <a:t>Diag17 - </a:t>
+            </a:r>
+            <a:r>
+              <a:rPr lang="en-US" sz="3200" dirty="0" err="1"/>
+              <a:t>Soccorsi</a:t>
+            </a:r>
+            <a:endParaRPr lang="it-IT" sz="3200" i="1" dirty="0"/>
+          </a:p>
+        </p:txBody>
+      </p:sp>
+      <p:pic>
+        <p:nvPicPr>
+          <p:cNvPr id="9" name="Picture 2" descr="Università degli Studi di Milano-Bicocca - Wikipedia">
+            <a:extLst>
+              <a:ext uri="{FF2B5EF4-FFF2-40B4-BE49-F238E27FC236}">
+                <a16:creationId xmlns:a16="http://schemas.microsoft.com/office/drawing/2014/main" id="{9D1896BC-6EF3-43D9-B8A2-217137CA9550}"/>
+              </a:ext>
+            </a:extLst>
+          </p:cNvPr>
+          <p:cNvPicPr>
+            <a:picLocks noChangeAspect="1" noChangeArrowheads="1"/>
+          </p:cNvPicPr>
+          <p:nvPr/>
+        </p:nvPicPr>
+        <p:blipFill>
+          <a:blip r:embed="rId3">
+            <a:extLst>
+              <a:ext uri="{28A0092B-C50C-407E-A947-70E740481C1C}">
+                <a14:useLocalDpi xmlns:a14="http://schemas.microsoft.com/office/drawing/2010/main" val="0"/>
+              </a:ext>
+            </a:extLst>
+          </a:blip>
+          <a:srcRect/>
+          <a:stretch>
+            <a:fillRect/>
+          </a:stretch>
+        </p:blipFill>
+        <p:spPr bwMode="auto">
+          <a:xfrm>
+            <a:off x="215979" y="254984"/>
+            <a:ext cx="1346792" cy="1331078"/>
+          </a:xfrm>
+          <a:prstGeom prst="rect">
+            <a:avLst/>
+          </a:prstGeom>
+          <a:noFill/>
+          <a:extLst>
+            <a:ext uri="{909E8E84-426E-40DD-AFC4-6F175D3DCCD1}">
+              <a14:hiddenFill xmlns:a14="http://schemas.microsoft.com/office/drawing/2010/main">
+                <a:solidFill>
+                  <a:srgbClr val="FFFFFF"/>
+                </a:solidFill>
+              </a14:hiddenFill>
+            </a:ext>
+          </a:extLst>
+        </p:spPr>
+      </p:pic>
+      <p:pic>
+        <p:nvPicPr>
+          <p:cNvPr id="3" name="Picture 2" descr="Graphical user interface, text, application&#10;&#10;Description automatically generated">
+            <a:extLst>
+              <a:ext uri="{FF2B5EF4-FFF2-40B4-BE49-F238E27FC236}">
+                <a16:creationId xmlns:a16="http://schemas.microsoft.com/office/drawing/2014/main" id="{E9F997E0-7974-1264-56D1-9E04A6D19339}"/>
+              </a:ext>
+            </a:extLst>
+          </p:cNvPr>
+          <p:cNvPicPr>
+            <a:picLocks noChangeAspect="1"/>
+          </p:cNvPicPr>
+          <p:nvPr/>
+        </p:nvPicPr>
+        <p:blipFill>
+          <a:blip r:embed="rId4">
+            <a:extLst>
+              <a:ext uri="{28A0092B-C50C-407E-A947-70E740481C1C}">
+                <a14:useLocalDpi xmlns:a14="http://schemas.microsoft.com/office/drawing/2010/main" val="0"/>
+              </a:ext>
+            </a:extLst>
+          </a:blip>
+          <a:stretch>
+            <a:fillRect/>
+          </a:stretch>
+        </p:blipFill>
+        <p:spPr>
+          <a:xfrm>
+            <a:off x="376237" y="2695575"/>
+            <a:ext cx="11439525" cy="1466850"/>
+          </a:xfrm>
+          <a:prstGeom prst="rect">
+            <a:avLst/>
+          </a:prstGeom>
+        </p:spPr>
+      </p:pic>
+    </p:spTree>
+    <p:extLst>
+      <p:ext uri="{BB962C8B-B14F-4D97-AF65-F5344CB8AC3E}">
+        <p14:creationId xmlns:p14="http://schemas.microsoft.com/office/powerpoint/2010/main" val="3817002698"/>
+      </p:ext>
+    </p:extLst>
+  </p:cSld>
+  <p:clrMapOvr>
+    <a:masterClrMapping/>
+  </p:clrMapOvr>
+</p:sld>
+</file>
+
+<file path=ppt/slides/slide12.xml><?xml version="1.0" encoding="utf-8"?>
+<p:sld xmlns:a="http://schemas.openxmlformats.org/drawingml/2006/main" xmlns:r="http://schemas.openxmlformats.org/officeDocument/2006/relationships" xmlns:p="http://schemas.openxmlformats.org/presentationml/2006/main">
+  <p:cSld>
+    <p:spTree>
+      <p:nvGrpSpPr>
+        <p:cNvPr id="1" name=""/>
+        <p:cNvGrpSpPr/>
+        <p:nvPr/>
+      </p:nvGrpSpPr>
+      <p:grpSpPr>
+        <a:xfrm>
+          <a:off x="0" y="0"/>
+          <a:ext cx="0" cy="0"/>
+          <a:chOff x="0" y="0"/>
+          <a:chExt cx="0" cy="0"/>
+        </a:xfrm>
+      </p:grpSpPr>
+      <p:sp>
+        <p:nvSpPr>
+          <p:cNvPr id="4" name="Segnaposto numero diapositiva 3">
+            <a:extLst>
+              <a:ext uri="{FF2B5EF4-FFF2-40B4-BE49-F238E27FC236}">
+                <a16:creationId xmlns:a16="http://schemas.microsoft.com/office/drawing/2014/main" id="{91E057A0-BAB1-4D57-BDBD-F8F3DE02BEE1}"/>
+              </a:ext>
+            </a:extLst>
+          </p:cNvPr>
+          <p:cNvSpPr>
+            <a:spLocks noGrp="1"/>
+          </p:cNvSpPr>
+          <p:nvPr>
+            <p:ph type="sldNum" sz="quarter" idx="12"/>
+          </p:nvPr>
+        </p:nvSpPr>
+        <p:spPr/>
+        <p:txBody>
+          <a:bodyPr/>
+          <a:lstStyle/>
+          <a:p>
+            <a:fld id="{AFB85319-5DF8-4B17-9881-6D5B2C7AB305}" type="slidenum">
+              <a:rPr lang="it-IT" smtClean="0"/>
+              <a:t>12</a:t>
+            </a:fld>
+            <a:endParaRPr lang="it-IT"/>
+          </a:p>
+        </p:txBody>
+      </p:sp>
+      <p:pic>
+        <p:nvPicPr>
+          <p:cNvPr id="6" name="Immagine 5">
+            <a:extLst>
+              <a:ext uri="{FF2B5EF4-FFF2-40B4-BE49-F238E27FC236}">
+                <a16:creationId xmlns:a16="http://schemas.microsoft.com/office/drawing/2014/main" id="{64DD2710-C925-4AEB-B772-6D532D848EB4}"/>
+              </a:ext>
+            </a:extLst>
+          </p:cNvPr>
+          <p:cNvPicPr>
+            <a:picLocks noChangeAspect="1"/>
+          </p:cNvPicPr>
+          <p:nvPr/>
+        </p:nvPicPr>
+        <p:blipFill rotWithShape="1">
+          <a:blip r:embed="rId2"/>
+          <a:srcRect l="5289" t="10969" r="42103" b="12551"/>
+          <a:stretch/>
+        </p:blipFill>
+        <p:spPr>
+          <a:xfrm>
+            <a:off x="215980" y="231353"/>
+            <a:ext cx="5672202" cy="1295266"/>
+          </a:xfrm>
+          <a:prstGeom prst="rect">
+            <a:avLst/>
+          </a:prstGeom>
+        </p:spPr>
+      </p:pic>
+      <p:sp>
+        <p:nvSpPr>
+          <p:cNvPr id="8" name="CasellaDiTesto 7">
+            <a:extLst>
+              <a:ext uri="{FF2B5EF4-FFF2-40B4-BE49-F238E27FC236}">
+                <a16:creationId xmlns:a16="http://schemas.microsoft.com/office/drawing/2014/main" id="{3E0E40B7-DD25-4779-A260-DCF2A62C4B41}"/>
+              </a:ext>
+            </a:extLst>
+          </p:cNvPr>
+          <p:cNvSpPr txBox="1"/>
+          <p:nvPr/>
+        </p:nvSpPr>
+        <p:spPr>
+          <a:xfrm>
+            <a:off x="1562771" y="772221"/>
+            <a:ext cx="4203202" cy="584775"/>
+          </a:xfrm>
+          <a:prstGeom prst="rect">
+            <a:avLst/>
+          </a:prstGeom>
+          <a:noFill/>
+        </p:spPr>
+        <p:txBody>
+          <a:bodyPr wrap="none" rtlCol="0">
+            <a:spAutoFit/>
+          </a:bodyPr>
+          <a:lstStyle>
+            <a:defPPr>
+              <a:defRPr lang="it-IT"/>
+            </a:defPPr>
+            <a:lvl1pPr>
+              <a:defRPr sz="4800">
+                <a:ln w="0"/>
+                <a:solidFill>
+                  <a:srgbClr val="002060"/>
+                </a:solidFill>
+                <a:effectLst>
+                  <a:outerShdw blurRad="38100" dist="25400" dir="5400000" algn="ctr" rotWithShape="0">
+                    <a:srgbClr val="6E747A">
+                      <a:alpha val="43000"/>
+                    </a:srgbClr>
+                  </a:outerShdw>
+                </a:effectLst>
+              </a:defRPr>
+            </a:lvl1pPr>
+          </a:lstStyle>
+          <a:p>
+            <a:r>
+              <a:rPr lang="en-US" sz="3200" dirty="0"/>
+              <a:t>Diag18 - </a:t>
+            </a:r>
+            <a:r>
+              <a:rPr lang="en-US" sz="3200" dirty="0" err="1"/>
+              <a:t>Comunicazione</a:t>
+            </a:r>
+            <a:endParaRPr lang="it-IT" sz="3200" i="1" dirty="0"/>
+          </a:p>
+        </p:txBody>
+      </p:sp>
+      <p:pic>
+        <p:nvPicPr>
+          <p:cNvPr id="9" name="Picture 2" descr="Università degli Studi di Milano-Bicocca - Wikipedia">
+            <a:extLst>
+              <a:ext uri="{FF2B5EF4-FFF2-40B4-BE49-F238E27FC236}">
+                <a16:creationId xmlns:a16="http://schemas.microsoft.com/office/drawing/2014/main" id="{9D1896BC-6EF3-43D9-B8A2-217137CA9550}"/>
+              </a:ext>
+            </a:extLst>
+          </p:cNvPr>
+          <p:cNvPicPr>
+            <a:picLocks noChangeAspect="1" noChangeArrowheads="1"/>
+          </p:cNvPicPr>
+          <p:nvPr/>
+        </p:nvPicPr>
+        <p:blipFill>
+          <a:blip r:embed="rId3">
+            <a:extLst>
+              <a:ext uri="{28A0092B-C50C-407E-A947-70E740481C1C}">
+                <a14:useLocalDpi xmlns:a14="http://schemas.microsoft.com/office/drawing/2010/main" val="0"/>
+              </a:ext>
+            </a:extLst>
+          </a:blip>
+          <a:srcRect/>
+          <a:stretch>
+            <a:fillRect/>
+          </a:stretch>
+        </p:blipFill>
+        <p:spPr bwMode="auto">
+          <a:xfrm>
+            <a:off x="215979" y="254984"/>
+            <a:ext cx="1346792" cy="1331078"/>
+          </a:xfrm>
+          <a:prstGeom prst="rect">
+            <a:avLst/>
+          </a:prstGeom>
+          <a:noFill/>
+          <a:extLst>
+            <a:ext uri="{909E8E84-426E-40DD-AFC4-6F175D3DCCD1}">
+              <a14:hiddenFill xmlns:a14="http://schemas.microsoft.com/office/drawing/2010/main">
+                <a:solidFill>
+                  <a:srgbClr val="FFFFFF"/>
+                </a:solidFill>
+              </a14:hiddenFill>
+            </a:ext>
+          </a:extLst>
+        </p:spPr>
+      </p:pic>
+      <p:pic>
+        <p:nvPicPr>
+          <p:cNvPr id="3" name="Picture 2">
+            <a:extLst>
+              <a:ext uri="{FF2B5EF4-FFF2-40B4-BE49-F238E27FC236}">
+                <a16:creationId xmlns:a16="http://schemas.microsoft.com/office/drawing/2014/main" id="{3DF80D3B-E78F-ECC4-C139-6BC5508C4493}"/>
+              </a:ext>
+            </a:extLst>
+          </p:cNvPr>
+          <p:cNvPicPr>
+            <a:picLocks noChangeAspect="1"/>
+          </p:cNvPicPr>
+          <p:nvPr/>
+        </p:nvPicPr>
+        <p:blipFill>
+          <a:blip r:embed="rId4">
+            <a:extLst>
+              <a:ext uri="{28A0092B-C50C-407E-A947-70E740481C1C}">
+                <a14:useLocalDpi xmlns:a14="http://schemas.microsoft.com/office/drawing/2010/main" val="0"/>
+              </a:ext>
+            </a:extLst>
+          </a:blip>
+          <a:stretch>
+            <a:fillRect/>
+          </a:stretch>
+        </p:blipFill>
+        <p:spPr>
+          <a:xfrm>
+            <a:off x="376237" y="2738437"/>
+            <a:ext cx="11439525" cy="1381125"/>
+          </a:xfrm>
+          <a:prstGeom prst="rect">
+            <a:avLst/>
+          </a:prstGeom>
+        </p:spPr>
+      </p:pic>
+    </p:spTree>
+    <p:extLst>
+      <p:ext uri="{BB962C8B-B14F-4D97-AF65-F5344CB8AC3E}">
+        <p14:creationId xmlns:p14="http://schemas.microsoft.com/office/powerpoint/2010/main" val="3037310452"/>
+      </p:ext>
+    </p:extLst>
+  </p:cSld>
+  <p:clrMapOvr>
+    <a:masterClrMapping/>
+  </p:clrMapOvr>
+</p:sld>
+</file>
+
 <file path=ppt/slides/slide2.xml><?xml version="1.0" encoding="utf-8"?>
 <p:sld xmlns:a="http://schemas.openxmlformats.org/drawingml/2006/main" xmlns:r="http://schemas.openxmlformats.org/officeDocument/2006/relationships" xmlns:p="http://schemas.openxmlformats.org/presentationml/2006/main">
   <p:cSld>
@@ -5590,6 +6297,241 @@
     <p:extLst>
       <p:ext uri="{BB962C8B-B14F-4D97-AF65-F5344CB8AC3E}">
         <p14:creationId xmlns:p14="http://schemas.microsoft.com/office/powerpoint/2010/main" val="1740860438"/>
+      </p:ext>
+    </p:extLst>
+  </p:cSld>
+  <p:clrMapOvr>
+    <a:masterClrMapping/>
+  </p:clrMapOvr>
+</p:sld>
+</file>
+
+<file path=ppt/slides/slide9.xml><?xml version="1.0" encoding="utf-8"?>
+<p:sld xmlns:a="http://schemas.openxmlformats.org/drawingml/2006/main" xmlns:r="http://schemas.openxmlformats.org/officeDocument/2006/relationships" xmlns:p="http://schemas.openxmlformats.org/presentationml/2006/main">
+  <p:cSld>
+    <p:spTree>
+      <p:nvGrpSpPr>
+        <p:cNvPr id="1" name=""/>
+        <p:cNvGrpSpPr/>
+        <p:nvPr/>
+      </p:nvGrpSpPr>
+      <p:grpSpPr>
+        <a:xfrm>
+          <a:off x="0" y="0"/>
+          <a:ext cx="0" cy="0"/>
+          <a:chOff x="0" y="0"/>
+          <a:chExt cx="0" cy="0"/>
+        </a:xfrm>
+      </p:grpSpPr>
+      <p:sp>
+        <p:nvSpPr>
+          <p:cNvPr id="4" name="Segnaposto numero diapositiva 3">
+            <a:extLst>
+              <a:ext uri="{FF2B5EF4-FFF2-40B4-BE49-F238E27FC236}">
+                <a16:creationId xmlns:a16="http://schemas.microsoft.com/office/drawing/2014/main" id="{91E057A0-BAB1-4D57-BDBD-F8F3DE02BEE1}"/>
+              </a:ext>
+            </a:extLst>
+          </p:cNvPr>
+          <p:cNvSpPr>
+            <a:spLocks noGrp="1"/>
+          </p:cNvSpPr>
+          <p:nvPr>
+            <p:ph type="sldNum" sz="quarter" idx="12"/>
+          </p:nvPr>
+        </p:nvSpPr>
+        <p:spPr/>
+        <p:txBody>
+          <a:bodyPr/>
+          <a:lstStyle/>
+          <a:p>
+            <a:fld id="{AFB85319-5DF8-4B17-9881-6D5B2C7AB305}" type="slidenum">
+              <a:rPr lang="it-IT" smtClean="0"/>
+              <a:t>9</a:t>
+            </a:fld>
+            <a:endParaRPr lang="it-IT"/>
+          </a:p>
+        </p:txBody>
+      </p:sp>
+      <p:pic>
+        <p:nvPicPr>
+          <p:cNvPr id="6" name="Immagine 5">
+            <a:extLst>
+              <a:ext uri="{FF2B5EF4-FFF2-40B4-BE49-F238E27FC236}">
+                <a16:creationId xmlns:a16="http://schemas.microsoft.com/office/drawing/2014/main" id="{64DD2710-C925-4AEB-B772-6D532D848EB4}"/>
+              </a:ext>
+            </a:extLst>
+          </p:cNvPr>
+          <p:cNvPicPr>
+            <a:picLocks noChangeAspect="1"/>
+          </p:cNvPicPr>
+          <p:nvPr/>
+        </p:nvPicPr>
+        <p:blipFill rotWithShape="1">
+          <a:blip r:embed="rId2"/>
+          <a:srcRect l="5288" t="10969" r="44930" b="12551"/>
+          <a:stretch/>
+        </p:blipFill>
+        <p:spPr>
+          <a:xfrm>
+            <a:off x="215981" y="120517"/>
+            <a:ext cx="5367402" cy="1295266"/>
+          </a:xfrm>
+          <a:prstGeom prst="rect">
+            <a:avLst/>
+          </a:prstGeom>
+        </p:spPr>
+      </p:pic>
+      <p:sp>
+        <p:nvSpPr>
+          <p:cNvPr id="8" name="CasellaDiTesto 7">
+            <a:extLst>
+              <a:ext uri="{FF2B5EF4-FFF2-40B4-BE49-F238E27FC236}">
+                <a16:creationId xmlns:a16="http://schemas.microsoft.com/office/drawing/2014/main" id="{3E0E40B7-DD25-4779-A260-DCF2A62C4B41}"/>
+              </a:ext>
+            </a:extLst>
+          </p:cNvPr>
+          <p:cNvSpPr txBox="1"/>
+          <p:nvPr/>
+        </p:nvSpPr>
+        <p:spPr>
+          <a:xfrm>
+            <a:off x="1562772" y="661385"/>
+            <a:ext cx="3914213" cy="584775"/>
+          </a:xfrm>
+          <a:prstGeom prst="rect">
+            <a:avLst/>
+          </a:prstGeom>
+          <a:noFill/>
+        </p:spPr>
+        <p:txBody>
+          <a:bodyPr wrap="none" rtlCol="0">
+            <a:spAutoFit/>
+          </a:bodyPr>
+          <a:lstStyle>
+            <a:defPPr>
+              <a:defRPr lang="it-IT"/>
+            </a:defPPr>
+            <a:lvl1pPr>
+              <a:defRPr sz="4800">
+                <a:ln w="0"/>
+                <a:solidFill>
+                  <a:srgbClr val="002060"/>
+                </a:solidFill>
+                <a:effectLst>
+                  <a:outerShdw blurRad="38100" dist="25400" dir="5400000" algn="ctr" rotWithShape="0">
+                    <a:srgbClr val="6E747A">
+                      <a:alpha val="43000"/>
+                    </a:srgbClr>
+                  </a:outerShdw>
+                </a:effectLst>
+              </a:defRPr>
+            </a:lvl1pPr>
+          </a:lstStyle>
+          <a:p>
+            <a:r>
+              <a:rPr lang="en-US" sz="3200" dirty="0"/>
+              <a:t>Diag15 - </a:t>
+            </a:r>
+            <a:r>
+              <a:rPr lang="en-US" sz="3200" dirty="0" err="1"/>
+              <a:t>Monitoraggio</a:t>
+            </a:r>
+            <a:endParaRPr lang="it-IT" sz="3200" i="1" dirty="0"/>
+          </a:p>
+        </p:txBody>
+      </p:sp>
+      <p:pic>
+        <p:nvPicPr>
+          <p:cNvPr id="9" name="Picture 2" descr="Università degli Studi di Milano-Bicocca - Wikipedia">
+            <a:extLst>
+              <a:ext uri="{FF2B5EF4-FFF2-40B4-BE49-F238E27FC236}">
+                <a16:creationId xmlns:a16="http://schemas.microsoft.com/office/drawing/2014/main" id="{9D1896BC-6EF3-43D9-B8A2-217137CA9550}"/>
+              </a:ext>
+            </a:extLst>
+          </p:cNvPr>
+          <p:cNvPicPr>
+            <a:picLocks noChangeAspect="1" noChangeArrowheads="1"/>
+          </p:cNvPicPr>
+          <p:nvPr/>
+        </p:nvPicPr>
+        <p:blipFill>
+          <a:blip r:embed="rId3">
+            <a:extLst>
+              <a:ext uri="{28A0092B-C50C-407E-A947-70E740481C1C}">
+                <a14:useLocalDpi xmlns:a14="http://schemas.microsoft.com/office/drawing/2010/main" val="0"/>
+              </a:ext>
+            </a:extLst>
+          </a:blip>
+          <a:srcRect/>
+          <a:stretch>
+            <a:fillRect/>
+          </a:stretch>
+        </p:blipFill>
+        <p:spPr bwMode="auto">
+          <a:xfrm>
+            <a:off x="215980" y="144148"/>
+            <a:ext cx="1346792" cy="1331078"/>
+          </a:xfrm>
+          <a:prstGeom prst="rect">
+            <a:avLst/>
+          </a:prstGeom>
+          <a:noFill/>
+          <a:extLst>
+            <a:ext uri="{909E8E84-426E-40DD-AFC4-6F175D3DCCD1}">
+              <a14:hiddenFill xmlns:a14="http://schemas.microsoft.com/office/drawing/2010/main">
+                <a:solidFill>
+                  <a:srgbClr val="FFFFFF"/>
+                </a:solidFill>
+              </a14:hiddenFill>
+            </a:ext>
+          </a:extLst>
+        </p:spPr>
+      </p:pic>
+      <p:pic>
+        <p:nvPicPr>
+          <p:cNvPr id="3" name="Picture 2" descr="A picture containing letter&#10;&#10;Description automatically generated">
+            <a:extLst>
+              <a:ext uri="{FF2B5EF4-FFF2-40B4-BE49-F238E27FC236}">
+                <a16:creationId xmlns:a16="http://schemas.microsoft.com/office/drawing/2014/main" id="{73DA17A4-31E2-0254-B041-597A2846006F}"/>
+              </a:ext>
+            </a:extLst>
+          </p:cNvPr>
+          <p:cNvPicPr>
+            <a:picLocks noChangeAspect="1"/>
+          </p:cNvPicPr>
+          <p:nvPr/>
+        </p:nvPicPr>
+        <p:blipFill>
+          <a:blip r:embed="rId4">
+            <a:extLst>
+              <a:ext uri="{28A0092B-C50C-407E-A947-70E740481C1C}">
+                <a14:useLocalDpi xmlns:a14="http://schemas.microsoft.com/office/drawing/2010/main" val="0"/>
+              </a:ext>
+            </a:extLst>
+          </a:blip>
+          <a:stretch>
+            <a:fillRect/>
+          </a:stretch>
+        </p:blipFill>
+        <p:spPr>
+          <a:xfrm>
+            <a:off x="5865963" y="975649"/>
+            <a:ext cx="6110056" cy="4906701"/>
+          </a:xfrm>
+          <a:prstGeom prst="rect">
+            <a:avLst/>
+          </a:prstGeom>
+          <a:ln>
+            <a:solidFill>
+              <a:schemeClr val="tx1"/>
+            </a:solidFill>
+          </a:ln>
+        </p:spPr>
+      </p:pic>
+    </p:spTree>
+    <p:extLst>
+      <p:ext uri="{BB962C8B-B14F-4D97-AF65-F5344CB8AC3E}">
+        <p14:creationId xmlns:p14="http://schemas.microsoft.com/office/powerpoint/2010/main" val="1316595795"/>
       </p:ext>
     </p:extLst>
   </p:cSld>

</xml_diff>